<commit_message>
First setup of new siebwalde app working, adding pages and navigation buttons. To do: - add user control for navigation buttons per main category
</commit_message>
<xml_diff>
--- a/SiebwaldeApp/Siebwalde Application.pptx
+++ b/SiebwaldeApp/Siebwalde Application.pptx
@@ -112,6 +112,11 @@
       </a:defRPr>
     </a:lvl9pPr>
   </p:defaultTextStyle>
+  <p:extLst>
+    <p:ext uri="{EFAFB233-063F-42B5-8137-9DF3F51BA10A}">
+      <p15:sldGuideLst xmlns:p15="http://schemas.microsoft.com/office/powerpoint/2012/main"/>
+    </p:ext>
+  </p:extLst>
 </p:presentation>
 </file>
 
@@ -274,7 +279,7 @@
           <a:p>
             <a:fld id="{05B2B154-7A6B-4EE9-AA96-51A3A257B010}" type="datetimeFigureOut">
               <a:rPr lang="nl-NL" smtClean="0"/>
-              <a:t>12-4-2020</a:t>
+              <a:t>22-4-2020</a:t>
             </a:fld>
             <a:endParaRPr lang="nl-NL"/>
           </a:p>
@@ -344,11 +349,11 @@
   <p:clrMapOvr>
     <a:masterClrMapping/>
   </p:clrMapOvr>
-  <mc:AlternateContent xmlns:mc="http://schemas.openxmlformats.org/markup-compatibility/2006">
-    <mc:Choice xmlns:p14="http://schemas.microsoft.com/office/powerpoint/2010/main" Requires="p14">
+  <mc:AlternateContent xmlns:mc="http://schemas.openxmlformats.org/markup-compatibility/2006" xmlns:p14="http://schemas.microsoft.com/office/powerpoint/2010/main">
+    <mc:Choice Requires="p14">
       <p:transition spd="slow" p14:dur="2000" advClick="0"/>
     </mc:Choice>
-    <mc:Fallback>
+    <mc:Fallback xmlns="">
       <p:transition spd="slow" advClick="0"/>
     </mc:Fallback>
   </mc:AlternateContent>
@@ -480,7 +485,7 @@
           <a:p>
             <a:fld id="{05B2B154-7A6B-4EE9-AA96-51A3A257B010}" type="datetimeFigureOut">
               <a:rPr lang="nl-NL" smtClean="0"/>
-              <a:t>12-4-2020</a:t>
+              <a:t>22-4-2020</a:t>
             </a:fld>
             <a:endParaRPr lang="nl-NL"/>
           </a:p>
@@ -550,11 +555,11 @@
   <p:clrMapOvr>
     <a:masterClrMapping/>
   </p:clrMapOvr>
-  <mc:AlternateContent xmlns:mc="http://schemas.openxmlformats.org/markup-compatibility/2006">
-    <mc:Choice xmlns:p14="http://schemas.microsoft.com/office/powerpoint/2010/main" Requires="p14">
+  <mc:AlternateContent xmlns:mc="http://schemas.openxmlformats.org/markup-compatibility/2006" xmlns:p14="http://schemas.microsoft.com/office/powerpoint/2010/main">
+    <mc:Choice Requires="p14">
       <p:transition spd="slow" p14:dur="2000" advClick="0"/>
     </mc:Choice>
-    <mc:Fallback>
+    <mc:Fallback xmlns="">
       <p:transition spd="slow" advClick="0"/>
     </mc:Fallback>
   </mc:AlternateContent>
@@ -696,7 +701,7 @@
           <a:p>
             <a:fld id="{05B2B154-7A6B-4EE9-AA96-51A3A257B010}" type="datetimeFigureOut">
               <a:rPr lang="nl-NL" smtClean="0"/>
-              <a:t>12-4-2020</a:t>
+              <a:t>22-4-2020</a:t>
             </a:fld>
             <a:endParaRPr lang="nl-NL"/>
           </a:p>
@@ -766,11 +771,11 @@
   <p:clrMapOvr>
     <a:masterClrMapping/>
   </p:clrMapOvr>
-  <mc:AlternateContent xmlns:mc="http://schemas.openxmlformats.org/markup-compatibility/2006">
-    <mc:Choice xmlns:p14="http://schemas.microsoft.com/office/powerpoint/2010/main" Requires="p14">
+  <mc:AlternateContent xmlns:mc="http://schemas.openxmlformats.org/markup-compatibility/2006" xmlns:p14="http://schemas.microsoft.com/office/powerpoint/2010/main">
+    <mc:Choice Requires="p14">
       <p:transition spd="slow" p14:dur="2000" advClick="0"/>
     </mc:Choice>
-    <mc:Fallback>
+    <mc:Fallback xmlns="">
       <p:transition spd="slow" advClick="0"/>
     </mc:Fallback>
   </mc:AlternateContent>
@@ -902,7 +907,7 @@
           <a:p>
             <a:fld id="{05B2B154-7A6B-4EE9-AA96-51A3A257B010}" type="datetimeFigureOut">
               <a:rPr lang="nl-NL" smtClean="0"/>
-              <a:t>12-4-2020</a:t>
+              <a:t>22-4-2020</a:t>
             </a:fld>
             <a:endParaRPr lang="nl-NL"/>
           </a:p>
@@ -972,11 +977,11 @@
   <p:clrMapOvr>
     <a:masterClrMapping/>
   </p:clrMapOvr>
-  <mc:AlternateContent xmlns:mc="http://schemas.openxmlformats.org/markup-compatibility/2006">
-    <mc:Choice xmlns:p14="http://schemas.microsoft.com/office/powerpoint/2010/main" Requires="p14">
+  <mc:AlternateContent xmlns:mc="http://schemas.openxmlformats.org/markup-compatibility/2006" xmlns:p14="http://schemas.microsoft.com/office/powerpoint/2010/main">
+    <mc:Choice Requires="p14">
       <p:transition spd="slow" p14:dur="2000" advClick="0"/>
     </mc:Choice>
-    <mc:Fallback>
+    <mc:Fallback xmlns="">
       <p:transition spd="slow" advClick="0"/>
     </mc:Fallback>
   </mc:AlternateContent>
@@ -1185,7 +1190,7 @@
           <a:p>
             <a:fld id="{05B2B154-7A6B-4EE9-AA96-51A3A257B010}" type="datetimeFigureOut">
               <a:rPr lang="nl-NL" smtClean="0"/>
-              <a:t>12-4-2020</a:t>
+              <a:t>22-4-2020</a:t>
             </a:fld>
             <a:endParaRPr lang="nl-NL"/>
           </a:p>
@@ -1255,11 +1260,11 @@
   <p:clrMapOvr>
     <a:masterClrMapping/>
   </p:clrMapOvr>
-  <mc:AlternateContent xmlns:mc="http://schemas.openxmlformats.org/markup-compatibility/2006">
-    <mc:Choice xmlns:p14="http://schemas.microsoft.com/office/powerpoint/2010/main" Requires="p14">
+  <mc:AlternateContent xmlns:mc="http://schemas.openxmlformats.org/markup-compatibility/2006" xmlns:p14="http://schemas.microsoft.com/office/powerpoint/2010/main">
+    <mc:Choice Requires="p14">
       <p:transition spd="slow" p14:dur="2000" advClick="0"/>
     </mc:Choice>
-    <mc:Fallback>
+    <mc:Fallback xmlns="">
       <p:transition spd="slow" advClick="0"/>
     </mc:Fallback>
   </mc:AlternateContent>
@@ -1458,7 +1463,7 @@
           <a:p>
             <a:fld id="{05B2B154-7A6B-4EE9-AA96-51A3A257B010}" type="datetimeFigureOut">
               <a:rPr lang="nl-NL" smtClean="0"/>
-              <a:t>12-4-2020</a:t>
+              <a:t>22-4-2020</a:t>
             </a:fld>
             <a:endParaRPr lang="nl-NL"/>
           </a:p>
@@ -1528,11 +1533,11 @@
   <p:clrMapOvr>
     <a:masterClrMapping/>
   </p:clrMapOvr>
-  <mc:AlternateContent xmlns:mc="http://schemas.openxmlformats.org/markup-compatibility/2006">
-    <mc:Choice xmlns:p14="http://schemas.microsoft.com/office/powerpoint/2010/main" Requires="p14">
+  <mc:AlternateContent xmlns:mc="http://schemas.openxmlformats.org/markup-compatibility/2006" xmlns:p14="http://schemas.microsoft.com/office/powerpoint/2010/main">
+    <mc:Choice Requires="p14">
       <p:transition spd="slow" p14:dur="2000" advClick="0"/>
     </mc:Choice>
-    <mc:Fallback>
+    <mc:Fallback xmlns="">
       <p:transition spd="slow" advClick="0"/>
     </mc:Fallback>
   </mc:AlternateContent>
@@ -1878,7 +1883,7 @@
           <a:p>
             <a:fld id="{05B2B154-7A6B-4EE9-AA96-51A3A257B010}" type="datetimeFigureOut">
               <a:rPr lang="nl-NL" smtClean="0"/>
-              <a:t>12-4-2020</a:t>
+              <a:t>22-4-2020</a:t>
             </a:fld>
             <a:endParaRPr lang="nl-NL"/>
           </a:p>
@@ -1948,11 +1953,11 @@
   <p:clrMapOvr>
     <a:masterClrMapping/>
   </p:clrMapOvr>
-  <mc:AlternateContent xmlns:mc="http://schemas.openxmlformats.org/markup-compatibility/2006">
-    <mc:Choice xmlns:p14="http://schemas.microsoft.com/office/powerpoint/2010/main" Requires="p14">
+  <mc:AlternateContent xmlns:mc="http://schemas.openxmlformats.org/markup-compatibility/2006" xmlns:p14="http://schemas.microsoft.com/office/powerpoint/2010/main">
+    <mc:Choice Requires="p14">
       <p:transition spd="slow" p14:dur="2000" advClick="0"/>
     </mc:Choice>
-    <mc:Fallback>
+    <mc:Fallback xmlns="">
       <p:transition spd="slow" advClick="0"/>
     </mc:Fallback>
   </mc:AlternateContent>
@@ -2027,7 +2032,7 @@
           <a:p>
             <a:fld id="{05B2B154-7A6B-4EE9-AA96-51A3A257B010}" type="datetimeFigureOut">
               <a:rPr lang="nl-NL" smtClean="0"/>
-              <a:t>12-4-2020</a:t>
+              <a:t>22-4-2020</a:t>
             </a:fld>
             <a:endParaRPr lang="nl-NL"/>
           </a:p>
@@ -2097,11 +2102,11 @@
   <p:clrMapOvr>
     <a:masterClrMapping/>
   </p:clrMapOvr>
-  <mc:AlternateContent xmlns:mc="http://schemas.openxmlformats.org/markup-compatibility/2006">
-    <mc:Choice xmlns:p14="http://schemas.microsoft.com/office/powerpoint/2010/main" Requires="p14">
+  <mc:AlternateContent xmlns:mc="http://schemas.openxmlformats.org/markup-compatibility/2006" xmlns:p14="http://schemas.microsoft.com/office/powerpoint/2010/main">
+    <mc:Choice Requires="p14">
       <p:transition spd="slow" p14:dur="2000" advClick="0"/>
     </mc:Choice>
-    <mc:Fallback>
+    <mc:Fallback xmlns="">
       <p:transition spd="slow" advClick="0"/>
     </mc:Fallback>
   </mc:AlternateContent>
@@ -2148,7 +2153,7 @@
           <a:p>
             <a:fld id="{05B2B154-7A6B-4EE9-AA96-51A3A257B010}" type="datetimeFigureOut">
               <a:rPr lang="nl-NL" smtClean="0"/>
-              <a:t>12-4-2020</a:t>
+              <a:t>22-4-2020</a:t>
             </a:fld>
             <a:endParaRPr lang="nl-NL"/>
           </a:p>
@@ -2218,11 +2223,11 @@
   <p:clrMapOvr>
     <a:masterClrMapping/>
   </p:clrMapOvr>
-  <mc:AlternateContent xmlns:mc="http://schemas.openxmlformats.org/markup-compatibility/2006">
-    <mc:Choice xmlns:p14="http://schemas.microsoft.com/office/powerpoint/2010/main" Requires="p14">
+  <mc:AlternateContent xmlns:mc="http://schemas.openxmlformats.org/markup-compatibility/2006" xmlns:p14="http://schemas.microsoft.com/office/powerpoint/2010/main">
+    <mc:Choice Requires="p14">
       <p:transition spd="slow" p14:dur="2000" advClick="0"/>
     </mc:Choice>
-    <mc:Fallback>
+    <mc:Fallback xmlns="">
       <p:transition spd="slow" advClick="0"/>
     </mc:Fallback>
   </mc:AlternateContent>
@@ -2467,7 +2472,7 @@
           <a:p>
             <a:fld id="{05B2B154-7A6B-4EE9-AA96-51A3A257B010}" type="datetimeFigureOut">
               <a:rPr lang="nl-NL" smtClean="0"/>
-              <a:t>12-4-2020</a:t>
+              <a:t>22-4-2020</a:t>
             </a:fld>
             <a:endParaRPr lang="nl-NL"/>
           </a:p>
@@ -2537,11 +2542,11 @@
   <p:clrMapOvr>
     <a:masterClrMapping/>
   </p:clrMapOvr>
-  <mc:AlternateContent xmlns:mc="http://schemas.openxmlformats.org/markup-compatibility/2006">
-    <mc:Choice xmlns:p14="http://schemas.microsoft.com/office/powerpoint/2010/main" Requires="p14">
+  <mc:AlternateContent xmlns:mc="http://schemas.openxmlformats.org/markup-compatibility/2006" xmlns:p14="http://schemas.microsoft.com/office/powerpoint/2010/main">
+    <mc:Choice Requires="p14">
       <p:transition spd="slow" p14:dur="2000" advClick="0"/>
     </mc:Choice>
-    <mc:Fallback>
+    <mc:Fallback xmlns="">
       <p:transition spd="slow" advClick="0"/>
     </mc:Fallback>
   </mc:AlternateContent>
@@ -2763,7 +2768,7 @@
           <a:p>
             <a:fld id="{05B2B154-7A6B-4EE9-AA96-51A3A257B010}" type="datetimeFigureOut">
               <a:rPr lang="nl-NL" smtClean="0"/>
-              <a:t>12-4-2020</a:t>
+              <a:t>22-4-2020</a:t>
             </a:fld>
             <a:endParaRPr lang="nl-NL"/>
           </a:p>
@@ -2833,11 +2838,11 @@
   <p:clrMapOvr>
     <a:masterClrMapping/>
   </p:clrMapOvr>
-  <mc:AlternateContent xmlns:mc="http://schemas.openxmlformats.org/markup-compatibility/2006">
-    <mc:Choice xmlns:p14="http://schemas.microsoft.com/office/powerpoint/2010/main" Requires="p14">
+  <mc:AlternateContent xmlns:mc="http://schemas.openxmlformats.org/markup-compatibility/2006" xmlns:p14="http://schemas.microsoft.com/office/powerpoint/2010/main">
+    <mc:Choice Requires="p14">
       <p:transition spd="slow" p14:dur="2000" advClick="0"/>
     </mc:Choice>
-    <mc:Fallback>
+    <mc:Fallback xmlns="">
       <p:transition spd="slow" advClick="0"/>
     </mc:Fallback>
   </mc:AlternateContent>
@@ -3015,7 +3020,7 @@
           <a:p>
             <a:fld id="{05B2B154-7A6B-4EE9-AA96-51A3A257B010}" type="datetimeFigureOut">
               <a:rPr lang="nl-NL" smtClean="0"/>
-              <a:t>12-4-2020</a:t>
+              <a:t>22-4-2020</a:t>
             </a:fld>
             <a:endParaRPr lang="nl-NL"/>
           </a:p>
@@ -3132,11 +3137,11 @@
     <p:sldLayoutId id="2147483658" r:id="rId10"/>
     <p:sldLayoutId id="2147483659" r:id="rId11"/>
   </p:sldLayoutIdLst>
-  <mc:AlternateContent xmlns:mc="http://schemas.openxmlformats.org/markup-compatibility/2006">
-    <mc:Choice xmlns:p14="http://schemas.microsoft.com/office/powerpoint/2010/main" Requires="p14">
+  <mc:AlternateContent xmlns:mc="http://schemas.openxmlformats.org/markup-compatibility/2006" xmlns:p14="http://schemas.microsoft.com/office/powerpoint/2010/main">
+    <mc:Choice Requires="p14">
       <p:transition spd="slow" p14:dur="2000" advClick="0"/>
     </mc:Choice>
-    <mc:Fallback>
+    <mc:Fallback xmlns="">
       <p:transition spd="slow" advClick="0"/>
     </mc:Fallback>
   </mc:AlternateContent>
@@ -3928,66 +3933,6 @@
           </a:prstGeom>
         </p:spPr>
       </p:pic>
-      <p:pic>
-        <p:nvPicPr>
-          <p:cNvPr id="21" name="Afbeelding 20">
-            <a:hlinkClick r:id="rId8" action="ppaction://hlinksldjump"/>
-            <a:extLst>
-              <a:ext uri="{FF2B5EF4-FFF2-40B4-BE49-F238E27FC236}">
-                <a16:creationId xmlns:a16="http://schemas.microsoft.com/office/drawing/2014/main" id="{E0AD2133-5B15-457E-92D6-8558ABBEE601}"/>
-              </a:ext>
-            </a:extLst>
-          </p:cNvPr>
-          <p:cNvPicPr>
-            <a:picLocks noChangeAspect="1"/>
-          </p:cNvPicPr>
-          <p:nvPr/>
-        </p:nvPicPr>
-        <p:blipFill rotWithShape="1">
-          <a:blip r:embed="rId9"/>
-          <a:srcRect l="7336" t="11286" r="14615" b="11571"/>
-          <a:stretch/>
-        </p:blipFill>
-        <p:spPr>
-          <a:xfrm>
-            <a:off x="125033" y="867784"/>
-            <a:ext cx="304800" cy="257175"/>
-          </a:xfrm>
-          <a:prstGeom prst="rect">
-            <a:avLst/>
-          </a:prstGeom>
-        </p:spPr>
-      </p:pic>
-      <p:pic>
-        <p:nvPicPr>
-          <p:cNvPr id="8" name="Afbeelding 7">
-            <a:hlinkClick r:id="rId10" action="ppaction://hlinksldjump"/>
-            <a:extLst>
-              <a:ext uri="{FF2B5EF4-FFF2-40B4-BE49-F238E27FC236}">
-                <a16:creationId xmlns:a16="http://schemas.microsoft.com/office/drawing/2014/main" id="{588D2820-CA23-4721-BF80-2F36F36CD223}"/>
-              </a:ext>
-            </a:extLst>
-          </p:cNvPr>
-          <p:cNvPicPr>
-            <a:picLocks noChangeAspect="1"/>
-          </p:cNvPicPr>
-          <p:nvPr/>
-        </p:nvPicPr>
-        <p:blipFill rotWithShape="1">
-          <a:blip r:embed="rId11"/>
-          <a:srcRect l="15669" t="10429" r="12903" b="9165"/>
-          <a:stretch/>
-        </p:blipFill>
-        <p:spPr>
-          <a:xfrm>
-            <a:off x="144083" y="5706847"/>
-            <a:ext cx="285750" cy="283369"/>
-          </a:xfrm>
-          <a:prstGeom prst="rect">
-            <a:avLst/>
-          </a:prstGeom>
-        </p:spPr>
-      </p:pic>
       <p:sp>
         <p:nvSpPr>
           <p:cNvPr id="48" name="Rechthoek 47">
@@ -4063,13 +4008,13 @@
           <p:nvPr/>
         </p:nvPicPr>
         <p:blipFill>
-          <a:blip r:embed="rId12">
+          <a:blip r:embed="rId8">
             <a:extLst>
               <a:ext uri="{28A0092B-C50C-407E-A947-70E740481C1C}">
                 <a14:useLocalDpi xmlns:a14="http://schemas.microsoft.com/office/drawing/2010/main" val="0"/>
               </a:ext>
               <a:ext uri="{837473B0-CC2E-450A-ABE3-18F120FF3D39}">
-                <a1611:picAttrSrcUrl xmlns:a1611="http://schemas.microsoft.com/office/drawing/2016/11/main" r:id="rId13"/>
+                <a1611:picAttrSrcUrl xmlns:a1611="http://schemas.microsoft.com/office/drawing/2016/11/main" r:id="rId9"/>
               </a:ext>
             </a:extLst>
           </a:blip>
@@ -4081,6 +4026,36 @@
           <a:xfrm>
             <a:off x="2600076" y="867784"/>
             <a:ext cx="7129839" cy="4488828"/>
+          </a:xfrm>
+          <a:prstGeom prst="rect">
+            <a:avLst/>
+          </a:prstGeom>
+        </p:spPr>
+      </p:pic>
+      <p:pic>
+        <p:nvPicPr>
+          <p:cNvPr id="18" name="Afbeelding 17">
+            <a:hlinkClick r:id="rId10" action="ppaction://hlinksldjump"/>
+            <a:extLst>
+              <a:ext uri="{FF2B5EF4-FFF2-40B4-BE49-F238E27FC236}">
+                <a16:creationId xmlns:a16="http://schemas.microsoft.com/office/drawing/2014/main" id="{C8E26FC7-573E-4F0A-9E86-838F0BBECF7F}"/>
+              </a:ext>
+            </a:extLst>
+          </p:cNvPr>
+          <p:cNvPicPr>
+            <a:picLocks noChangeAspect="1"/>
+          </p:cNvPicPr>
+          <p:nvPr/>
+        </p:nvPicPr>
+        <p:blipFill rotWithShape="1">
+          <a:blip r:embed="rId11"/>
+          <a:srcRect l="13932" t="19234" r="18132" b="8606"/>
+          <a:stretch/>
+        </p:blipFill>
+        <p:spPr>
+          <a:xfrm>
+            <a:off x="125033" y="867784"/>
+            <a:ext cx="297656" cy="302420"/>
           </a:xfrm>
           <a:prstGeom prst="rect">
             <a:avLst/>
@@ -4097,11 +4072,11 @@
   <p:clrMapOvr>
     <a:masterClrMapping/>
   </p:clrMapOvr>
-  <mc:AlternateContent xmlns:mc="http://schemas.openxmlformats.org/markup-compatibility/2006">
-    <mc:Choice xmlns:p14="http://schemas.microsoft.com/office/powerpoint/2010/main" Requires="p14">
+  <mc:AlternateContent xmlns:mc="http://schemas.openxmlformats.org/markup-compatibility/2006" xmlns:p14="http://schemas.microsoft.com/office/powerpoint/2010/main">
+    <mc:Choice Requires="p14">
       <p:transition spd="slow" p14:dur="2000" advClick="0"/>
     </mc:Choice>
-    <mc:Fallback>
+    <mc:Fallback xmlns="">
       <p:transition spd="slow" advClick="0"/>
     </mc:Fallback>
   </mc:AlternateContent>
@@ -4330,11 +4305,11 @@
       </p:pic>
       <p:pic>
         <p:nvPicPr>
-          <p:cNvPr id="19" name="Afbeelding 18">
+          <p:cNvPr id="22" name="Afbeelding 21">
             <a:hlinkClick r:id="rId4" action="ppaction://hlinksldjump"/>
             <a:extLst>
               <a:ext uri="{FF2B5EF4-FFF2-40B4-BE49-F238E27FC236}">
-                <a16:creationId xmlns:a16="http://schemas.microsoft.com/office/drawing/2014/main" id="{58A9AEDA-1FB1-4A4C-8C1C-4A8D346086BD}"/>
+                <a16:creationId xmlns:a16="http://schemas.microsoft.com/office/drawing/2014/main" id="{9CB7D866-4B39-4C5F-A990-9052305FC7D6}"/>
               </a:ext>
             </a:extLst>
           </p:cNvPr>
@@ -4345,42 +4320,12 @@
         </p:nvPicPr>
         <p:blipFill rotWithShape="1">
           <a:blip r:embed="rId5"/>
-          <a:srcRect l="7336" t="11286" r="14615" b="11571"/>
-          <a:stretch/>
-        </p:blipFill>
-        <p:spPr>
-          <a:xfrm>
-            <a:off x="125033" y="867784"/>
-            <a:ext cx="304800" cy="257175"/>
-          </a:xfrm>
-          <a:prstGeom prst="rect">
-            <a:avLst/>
-          </a:prstGeom>
-        </p:spPr>
-      </p:pic>
-      <p:pic>
-        <p:nvPicPr>
-          <p:cNvPr id="22" name="Afbeelding 21">
-            <a:hlinkClick r:id="rId6" action="ppaction://hlinksldjump"/>
-            <a:extLst>
-              <a:ext uri="{FF2B5EF4-FFF2-40B4-BE49-F238E27FC236}">
-                <a16:creationId xmlns:a16="http://schemas.microsoft.com/office/drawing/2014/main" id="{9CB7D866-4B39-4C5F-A990-9052305FC7D6}"/>
-              </a:ext>
-            </a:extLst>
-          </p:cNvPr>
-          <p:cNvPicPr>
-            <a:picLocks noChangeAspect="1"/>
-          </p:cNvPicPr>
-          <p:nvPr/>
-        </p:nvPicPr>
-        <p:blipFill rotWithShape="1">
-          <a:blip r:embed="rId7"/>
           <a:srcRect l="15669" t="10429" r="12903" b="9165"/>
           <a:stretch/>
         </p:blipFill>
         <p:spPr>
           <a:xfrm>
-            <a:off x="144083" y="5706847"/>
+            <a:off x="144083" y="1341437"/>
             <a:ext cx="285750" cy="283369"/>
           </a:xfrm>
           <a:prstGeom prst="rect">
@@ -7596,7 +7541,7 @@
       <p:sp>
         <p:nvSpPr>
           <p:cNvPr id="25" name="Rechthoek 24">
-            <a:hlinkClick r:id="rId8" action="ppaction://hlinksldjump"/>
+            <a:hlinkClick r:id="rId6" action="ppaction://hlinksldjump"/>
             <a:extLst>
               <a:ext uri="{FF2B5EF4-FFF2-40B4-BE49-F238E27FC236}">
                 <a16:creationId xmlns:a16="http://schemas.microsoft.com/office/drawing/2014/main" id="{F5609A96-89E0-469F-A7F0-ADB617C75C39}"/>
@@ -7653,7 +7598,7 @@
       <p:sp>
         <p:nvSpPr>
           <p:cNvPr id="26" name="Rechthoek 25">
-            <a:hlinkClick r:id="rId9" action="ppaction://hlinksldjump"/>
+            <a:hlinkClick r:id="rId7" action="ppaction://hlinksldjump"/>
             <a:extLst>
               <a:ext uri="{FF2B5EF4-FFF2-40B4-BE49-F238E27FC236}">
                 <a16:creationId xmlns:a16="http://schemas.microsoft.com/office/drawing/2014/main" id="{C8FD4839-065B-4F90-AFD6-959E0D2C73B1}"/>
@@ -7710,7 +7655,7 @@
       <p:sp>
         <p:nvSpPr>
           <p:cNvPr id="27" name="Rechthoek 26">
-            <a:hlinkClick r:id="rId10" action="ppaction://hlinksldjump"/>
+            <a:hlinkClick r:id="rId8" action="ppaction://hlinksldjump"/>
             <a:extLst>
               <a:ext uri="{FF2B5EF4-FFF2-40B4-BE49-F238E27FC236}">
                 <a16:creationId xmlns:a16="http://schemas.microsoft.com/office/drawing/2014/main" id="{0B459794-7508-4ACA-97EA-BB0EFC8D593A}"/>
@@ -7767,7 +7712,7 @@
       <p:sp>
         <p:nvSpPr>
           <p:cNvPr id="28" name="Rechthoek 27">
-            <a:hlinkClick r:id="rId11" action="ppaction://hlinksldjump"/>
+            <a:hlinkClick r:id="rId9" action="ppaction://hlinksldjump"/>
             <a:extLst>
               <a:ext uri="{FF2B5EF4-FFF2-40B4-BE49-F238E27FC236}">
                 <a16:creationId xmlns:a16="http://schemas.microsoft.com/office/drawing/2014/main" id="{F9B347D0-B213-4115-984C-6A5C2FDCBC75}"/>
@@ -7821,6 +7766,36 @@
           </a:p>
         </p:txBody>
       </p:sp>
+      <p:pic>
+        <p:nvPicPr>
+          <p:cNvPr id="16" name="Afbeelding 15">
+            <a:hlinkClick r:id="rId10" action="ppaction://hlinksldjump"/>
+            <a:extLst>
+              <a:ext uri="{FF2B5EF4-FFF2-40B4-BE49-F238E27FC236}">
+                <a16:creationId xmlns:a16="http://schemas.microsoft.com/office/drawing/2014/main" id="{A959D9C8-ECED-4693-870F-90B4C822D561}"/>
+              </a:ext>
+            </a:extLst>
+          </p:cNvPr>
+          <p:cNvPicPr>
+            <a:picLocks noChangeAspect="1"/>
+          </p:cNvPicPr>
+          <p:nvPr/>
+        </p:nvPicPr>
+        <p:blipFill rotWithShape="1">
+          <a:blip r:embed="rId11"/>
+          <a:srcRect l="13932" t="19234" r="18132" b="8606"/>
+          <a:stretch/>
+        </p:blipFill>
+        <p:spPr>
+          <a:xfrm>
+            <a:off x="125033" y="867784"/>
+            <a:ext cx="297656" cy="302420"/>
+          </a:xfrm>
+          <a:prstGeom prst="rect">
+            <a:avLst/>
+          </a:prstGeom>
+        </p:spPr>
+      </p:pic>
     </p:spTree>
     <p:extLst>
       <p:ext uri="{BB962C8B-B14F-4D97-AF65-F5344CB8AC3E}">
@@ -7831,11 +7806,11 @@
   <p:clrMapOvr>
     <a:masterClrMapping/>
   </p:clrMapOvr>
-  <mc:AlternateContent xmlns:mc="http://schemas.openxmlformats.org/markup-compatibility/2006">
-    <mc:Choice xmlns:p14="http://schemas.microsoft.com/office/powerpoint/2010/main" Requires="p14">
+  <mc:AlternateContent xmlns:mc="http://schemas.openxmlformats.org/markup-compatibility/2006" xmlns:p14="http://schemas.microsoft.com/office/powerpoint/2010/main">
+    <mc:Choice Requires="p14">
       <p:transition spd="slow" p14:dur="2000" advClick="0"/>
     </mc:Choice>
-    <mc:Fallback>
+    <mc:Fallback xmlns="">
       <p:transition spd="slow" advClick="0"/>
     </mc:Fallback>
   </mc:AlternateContent>
@@ -8847,11 +8822,11 @@
       </p:pic>
       <p:pic>
         <p:nvPicPr>
-          <p:cNvPr id="29" name="Afbeelding 28">
+          <p:cNvPr id="31" name="Afbeelding 30">
             <a:hlinkClick r:id="rId5" action="ppaction://hlinksldjump"/>
             <a:extLst>
               <a:ext uri="{FF2B5EF4-FFF2-40B4-BE49-F238E27FC236}">
-                <a16:creationId xmlns:a16="http://schemas.microsoft.com/office/drawing/2014/main" id="{A57EA908-1069-43F2-BCD9-1C2777051110}"/>
+                <a16:creationId xmlns:a16="http://schemas.microsoft.com/office/drawing/2014/main" id="{59104204-5D52-416F-A49E-615727C93AC0}"/>
               </a:ext>
             </a:extLst>
           </p:cNvPr>
@@ -8862,42 +8837,12 @@
         </p:nvPicPr>
         <p:blipFill rotWithShape="1">
           <a:blip r:embed="rId6"/>
-          <a:srcRect l="7336" t="11286" r="14615" b="11571"/>
-          <a:stretch/>
-        </p:blipFill>
-        <p:spPr>
-          <a:xfrm>
-            <a:off x="125033" y="867784"/>
-            <a:ext cx="304800" cy="257175"/>
-          </a:xfrm>
-          <a:prstGeom prst="rect">
-            <a:avLst/>
-          </a:prstGeom>
-        </p:spPr>
-      </p:pic>
-      <p:pic>
-        <p:nvPicPr>
-          <p:cNvPr id="31" name="Afbeelding 30">
-            <a:hlinkClick r:id="rId7" action="ppaction://hlinksldjump"/>
-            <a:extLst>
-              <a:ext uri="{FF2B5EF4-FFF2-40B4-BE49-F238E27FC236}">
-                <a16:creationId xmlns:a16="http://schemas.microsoft.com/office/drawing/2014/main" id="{59104204-5D52-416F-A49E-615727C93AC0}"/>
-              </a:ext>
-            </a:extLst>
-          </p:cNvPr>
-          <p:cNvPicPr>
-            <a:picLocks noChangeAspect="1"/>
-          </p:cNvPicPr>
-          <p:nvPr/>
-        </p:nvPicPr>
-        <p:blipFill rotWithShape="1">
-          <a:blip r:embed="rId8"/>
           <a:srcRect l="15669" t="10429" r="12903" b="9165"/>
           <a:stretch/>
         </p:blipFill>
         <p:spPr>
           <a:xfrm>
-            <a:off x="144083" y="5706847"/>
+            <a:off x="144083" y="1310294"/>
             <a:ext cx="285750" cy="283369"/>
           </a:xfrm>
           <a:prstGeom prst="rect">
@@ -8965,7 +8910,7 @@
       <p:sp>
         <p:nvSpPr>
           <p:cNvPr id="35" name="Rechthoek 34">
-            <a:hlinkClick r:id="rId9" action="ppaction://hlinksldjump"/>
+            <a:hlinkClick r:id="rId7" action="ppaction://hlinksldjump"/>
             <a:extLst>
               <a:ext uri="{FF2B5EF4-FFF2-40B4-BE49-F238E27FC236}">
                 <a16:creationId xmlns:a16="http://schemas.microsoft.com/office/drawing/2014/main" id="{6D05AB79-9E87-4230-8C0C-48BF3FB38493}"/>
@@ -9022,7 +8967,7 @@
       <p:sp>
         <p:nvSpPr>
           <p:cNvPr id="42" name="Rechthoek 41">
-            <a:hlinkClick r:id="rId10" action="ppaction://hlinksldjump"/>
+            <a:hlinkClick r:id="rId8" action="ppaction://hlinksldjump"/>
             <a:extLst>
               <a:ext uri="{FF2B5EF4-FFF2-40B4-BE49-F238E27FC236}">
                 <a16:creationId xmlns:a16="http://schemas.microsoft.com/office/drawing/2014/main" id="{39828C4A-1305-46D1-9CDB-93B99690B32A}"/>
@@ -9079,7 +9024,7 @@
       <p:sp>
         <p:nvSpPr>
           <p:cNvPr id="48" name="Rechthoek 47">
-            <a:hlinkClick r:id="rId11" action="ppaction://hlinksldjump"/>
+            <a:hlinkClick r:id="rId9" action="ppaction://hlinksldjump"/>
             <a:extLst>
               <a:ext uri="{FF2B5EF4-FFF2-40B4-BE49-F238E27FC236}">
                 <a16:creationId xmlns:a16="http://schemas.microsoft.com/office/drawing/2014/main" id="{86897DA1-AA90-437E-B44C-AC625F9CAA85}"/>
@@ -9136,7 +9081,7 @@
       <p:sp>
         <p:nvSpPr>
           <p:cNvPr id="49" name="Rechthoek 48">
-            <a:hlinkClick r:id="rId12" action="ppaction://hlinksldjump"/>
+            <a:hlinkClick r:id="rId10" action="ppaction://hlinksldjump"/>
             <a:extLst>
               <a:ext uri="{FF2B5EF4-FFF2-40B4-BE49-F238E27FC236}">
                 <a16:creationId xmlns:a16="http://schemas.microsoft.com/office/drawing/2014/main" id="{5309FF3A-F07F-4B8B-B501-F94A55E6FE35}"/>
@@ -9190,6 +9135,36 @@
           </a:p>
         </p:txBody>
       </p:sp>
+      <p:pic>
+        <p:nvPicPr>
+          <p:cNvPr id="27" name="Afbeelding 26">
+            <a:hlinkClick r:id="rId11" action="ppaction://hlinksldjump"/>
+            <a:extLst>
+              <a:ext uri="{FF2B5EF4-FFF2-40B4-BE49-F238E27FC236}">
+                <a16:creationId xmlns:a16="http://schemas.microsoft.com/office/drawing/2014/main" id="{650C0BB4-5FF7-4D71-992B-5D2F11C29D75}"/>
+              </a:ext>
+            </a:extLst>
+          </p:cNvPr>
+          <p:cNvPicPr>
+            <a:picLocks noChangeAspect="1"/>
+          </p:cNvPicPr>
+          <p:nvPr/>
+        </p:nvPicPr>
+        <p:blipFill rotWithShape="1">
+          <a:blip r:embed="rId12"/>
+          <a:srcRect l="13932" t="19234" r="18132" b="8606"/>
+          <a:stretch/>
+        </p:blipFill>
+        <p:spPr>
+          <a:xfrm>
+            <a:off x="125033" y="855029"/>
+            <a:ext cx="297656" cy="302420"/>
+          </a:xfrm>
+          <a:prstGeom prst="rect">
+            <a:avLst/>
+          </a:prstGeom>
+        </p:spPr>
+      </p:pic>
     </p:spTree>
     <p:extLst>
       <p:ext uri="{BB962C8B-B14F-4D97-AF65-F5344CB8AC3E}">
@@ -9200,11 +9175,11 @@
   <p:clrMapOvr>
     <a:masterClrMapping/>
   </p:clrMapOvr>
-  <mc:AlternateContent xmlns:mc="http://schemas.openxmlformats.org/markup-compatibility/2006">
-    <mc:Choice xmlns:p14="http://schemas.microsoft.com/office/powerpoint/2010/main" Requires="p14">
+  <mc:AlternateContent xmlns:mc="http://schemas.openxmlformats.org/markup-compatibility/2006" xmlns:p14="http://schemas.microsoft.com/office/powerpoint/2010/main">
+    <mc:Choice Requires="p14">
       <p:transition spd="slow" p14:dur="2000" advClick="0"/>
     </mc:Choice>
-    <mc:Fallback>
+    <mc:Fallback xmlns="">
       <p:transition spd="slow" advClick="0"/>
     </mc:Fallback>
   </mc:AlternateContent>
@@ -9903,11 +9878,11 @@
   <p:clrMapOvr>
     <a:masterClrMapping/>
   </p:clrMapOvr>
-  <mc:AlternateContent xmlns:mc="http://schemas.openxmlformats.org/markup-compatibility/2006">
-    <mc:Choice xmlns:p14="http://schemas.microsoft.com/office/powerpoint/2010/main" Requires="p14">
+  <mc:AlternateContent xmlns:mc="http://schemas.openxmlformats.org/markup-compatibility/2006" xmlns:p14="http://schemas.microsoft.com/office/powerpoint/2010/main">
+    <mc:Choice Requires="p14">
       <p:transition spd="slow" p14:dur="2000" advClick="0"/>
     </mc:Choice>
-    <mc:Fallback>
+    <mc:Fallback xmlns="">
       <p:transition spd="slow" advClick="0"/>
     </mc:Fallback>
   </mc:AlternateContent>
@@ -12680,11 +12655,11 @@
   <p:clrMapOvr>
     <a:masterClrMapping/>
   </p:clrMapOvr>
-  <mc:AlternateContent xmlns:mc="http://schemas.openxmlformats.org/markup-compatibility/2006">
-    <mc:Choice xmlns:p14="http://schemas.microsoft.com/office/powerpoint/2010/main" Requires="p14">
+  <mc:AlternateContent xmlns:mc="http://schemas.openxmlformats.org/markup-compatibility/2006" xmlns:p14="http://schemas.microsoft.com/office/powerpoint/2010/main">
+    <mc:Choice Requires="p14">
       <p:transition spd="slow" p14:dur="2000" advClick="0"/>
     </mc:Choice>
-    <mc:Fallback>
+    <mc:Fallback xmlns="">
       <p:transition spd="slow" advClick="0"/>
     </mc:Fallback>
   </mc:AlternateContent>
@@ -16414,11 +16389,11 @@
   <p:clrMapOvr>
     <a:masterClrMapping/>
   </p:clrMapOvr>
-  <mc:AlternateContent xmlns:mc="http://schemas.openxmlformats.org/markup-compatibility/2006">
-    <mc:Choice xmlns:p14="http://schemas.microsoft.com/office/powerpoint/2010/main" Requires="p14">
+  <mc:AlternateContent xmlns:mc="http://schemas.openxmlformats.org/markup-compatibility/2006" xmlns:p14="http://schemas.microsoft.com/office/powerpoint/2010/main">
+    <mc:Choice Requires="p14">
       <p:transition spd="slow" p14:dur="2000" advClick="0"/>
     </mc:Choice>
-    <mc:Fallback>
+    <mc:Fallback xmlns="">
       <p:transition spd="slow" advClick="0"/>
     </mc:Fallback>
   </mc:AlternateContent>
@@ -17027,11 +17002,11 @@
   <p:clrMapOvr>
     <a:masterClrMapping/>
   </p:clrMapOvr>
-  <mc:AlternateContent xmlns:mc="http://schemas.openxmlformats.org/markup-compatibility/2006">
-    <mc:Choice xmlns:p14="http://schemas.microsoft.com/office/powerpoint/2010/main" Requires="p14">
+  <mc:AlternateContent xmlns:mc="http://schemas.openxmlformats.org/markup-compatibility/2006" xmlns:p14="http://schemas.microsoft.com/office/powerpoint/2010/main">
+    <mc:Choice Requires="p14">
       <p:transition spd="slow" p14:dur="2000" advClick="0"/>
     </mc:Choice>
-    <mc:Fallback>
+    <mc:Fallback xmlns="">
       <p:transition spd="slow" advClick="0"/>
     </mc:Fallback>
   </mc:AlternateContent>
@@ -17471,11 +17446,11 @@
   <p:clrMapOvr>
     <a:masterClrMapping/>
   </p:clrMapOvr>
-  <mc:AlternateContent xmlns:mc="http://schemas.openxmlformats.org/markup-compatibility/2006">
-    <mc:Choice xmlns:p14="http://schemas.microsoft.com/office/powerpoint/2010/main" Requires="p14">
+  <mc:AlternateContent xmlns:mc="http://schemas.openxmlformats.org/markup-compatibility/2006" xmlns:p14="http://schemas.microsoft.com/office/powerpoint/2010/main">
+    <mc:Choice Requires="p14">
       <p:transition spd="slow" p14:dur="2000" advClick="0"/>
     </mc:Choice>
-    <mc:Fallback>
+    <mc:Fallback xmlns="">
       <p:transition spd="slow" advClick="0"/>
     </mc:Fallback>
   </mc:AlternateContent>
@@ -17915,11 +17890,11 @@
   <p:clrMapOvr>
     <a:masterClrMapping/>
   </p:clrMapOvr>
-  <mc:AlternateContent xmlns:mc="http://schemas.openxmlformats.org/markup-compatibility/2006">
-    <mc:Choice xmlns:p14="http://schemas.microsoft.com/office/powerpoint/2010/main" Requires="p14">
+  <mc:AlternateContent xmlns:mc="http://schemas.openxmlformats.org/markup-compatibility/2006" xmlns:p14="http://schemas.microsoft.com/office/powerpoint/2010/main">
+    <mc:Choice Requires="p14">
       <p:transition spd="slow" p14:dur="2000" advClick="0"/>
     </mc:Choice>
-    <mc:Fallback>
+    <mc:Fallback xmlns="">
       <p:transition spd="slow" advClick="0"/>
     </mc:Fallback>
   </mc:AlternateContent>
@@ -18229,13 +18204,13 @@
 
 <file path=customXml/item2.xml><?xml version="1.0" encoding="utf-8"?>
 <Control xmlns="http://schemas.microsoft.com/VisualStudio/2011/storyboarding/control">
-  <Id Name="System.Storyboarding.WindowsAppIcons.Zoom" Revision="1" Stencil="System.Storyboarding.WindowsAppIcons" StencilVersion="0.1"/>
+  <Id Name="82c36015-ade2-4a83-9f09-ccb350f71a98" Revision="1" Stencil="System.MyShapes" StencilVersion="1.0"/>
 </Control>
 </file>
 
 <file path=customXml/item3.xml><?xml version="1.0" encoding="utf-8"?>
 <Control xmlns="http://schemas.microsoft.com/VisualStudio/2011/storyboarding/control">
-  <Id Name="82c36015-ade2-4a83-9f09-ccb350f71a98" Revision="1" Stencil="System.MyShapes" StencilVersion="1.0"/>
+  <Id Name="System.Storyboarding.WindowsAppIcons.Zoom" Revision="1" Stencil="System.Storyboarding.WindowsAppIcons" StencilVersion="0.1"/>
 </Control>
 </file>
 
@@ -18246,7 +18221,7 @@
 </file>
 
 <file path=customXml/itemProps1.xml><?xml version="1.0" encoding="utf-8"?>
-<ds:datastoreItem xmlns:ds="http://schemas.openxmlformats.org/officeDocument/2006/customXml" ds:itemID="{1DFAE48C-52E0-49FC-9BF2-2742E50ACFB1}">
+<ds:datastoreItem xmlns:ds="http://schemas.openxmlformats.org/officeDocument/2006/customXml" ds:itemID="{DAEAF679-C6A7-4410-A2CE-9B008421674A}">
   <ds:schemaRefs>
     <ds:schemaRef ds:uri="http://schemas.microsoft.com/VisualStudio/2011/storyboarding/control"/>
   </ds:schemaRefs>
@@ -18254,6 +18229,14 @@
 </file>
 
 <file path=customXml/itemProps2.xml><?xml version="1.0" encoding="utf-8"?>
+<ds:datastoreItem xmlns:ds="http://schemas.openxmlformats.org/officeDocument/2006/customXml" ds:itemID="{69DEB369-BFBB-474E-A768-B613739C8D21}">
+  <ds:schemaRefs>
+    <ds:schemaRef ds:uri="http://schemas.microsoft.com/VisualStudio/2011/storyboarding/control"/>
+  </ds:schemaRefs>
+</ds:datastoreItem>
+</file>
+
+<file path=customXml/itemProps3.xml><?xml version="1.0" encoding="utf-8"?>
 <ds:datastoreItem xmlns:ds="http://schemas.openxmlformats.org/officeDocument/2006/customXml" ds:itemID="{36DFCBAD-85EA-4926-9EE4-4BFC0E4E4535}">
   <ds:schemaRefs>
     <ds:schemaRef ds:uri="http://schemas.microsoft.com/VisualStudio/2011/storyboarding/control"/>
@@ -18261,16 +18244,8 @@
 </ds:datastoreItem>
 </file>
 
-<file path=customXml/itemProps3.xml><?xml version="1.0" encoding="utf-8"?>
-<ds:datastoreItem xmlns:ds="http://schemas.openxmlformats.org/officeDocument/2006/customXml" ds:itemID="{69DEB369-BFBB-474E-A768-B613739C8D21}">
-  <ds:schemaRefs>
-    <ds:schemaRef ds:uri="http://schemas.microsoft.com/VisualStudio/2011/storyboarding/control"/>
-  </ds:schemaRefs>
-</ds:datastoreItem>
-</file>
-
 <file path=customXml/itemProps4.xml><?xml version="1.0" encoding="utf-8"?>
-<ds:datastoreItem xmlns:ds="http://schemas.openxmlformats.org/officeDocument/2006/customXml" ds:itemID="{DAEAF679-C6A7-4410-A2CE-9B008421674A}">
+<ds:datastoreItem xmlns:ds="http://schemas.openxmlformats.org/officeDocument/2006/customXml" ds:itemID="{1DFAE48C-52E0-49FC-9BF2-2742E50ACFB1}">
   <ds:schemaRefs>
     <ds:schemaRef ds:uri="http://schemas.microsoft.com/VisualStudio/2011/storyboarding/control"/>
   </ds:schemaRefs>

</xml_diff>